<commit_message>
Update Images and PowerPoint
</commit_message>
<xml_diff>
--- a/MsalAndSimpleAuthorization.pptx
+++ b/MsalAndSimpleAuthorization.pptx
@@ -109,6 +109,11 @@
       </a:defRPr>
     </a:lvl9pPr>
   </p:defaultTextStyle>
+  <p:extLst>
+    <p:ext uri="{EFAFB233-063F-42B5-8137-9DF3F51BA10A}">
+      <p15:sldGuideLst xmlns:p15="http://schemas.microsoft.com/office/powerpoint/2012/main"/>
+    </p:ext>
+  </p:extLst>
 </p:presentation>
 </file>
 
@@ -267,7 +272,7 @@
           <a:p>
             <a:fld id="{8AB05285-0B91-4384-B165-2D0E05AA8C57}" type="datetimeFigureOut">
               <a:rPr lang="en-US" smtClean="0"/>
-              <a:t>5/16/2023</a:t>
+              <a:t>5/24/2023</a:t>
             </a:fld>
             <a:endParaRPr lang="en-US"/>
           </a:p>
@@ -465,7 +470,7 @@
           <a:p>
             <a:fld id="{8AB05285-0B91-4384-B165-2D0E05AA8C57}" type="datetimeFigureOut">
               <a:rPr lang="en-US" smtClean="0"/>
-              <a:t>5/16/2023</a:t>
+              <a:t>5/24/2023</a:t>
             </a:fld>
             <a:endParaRPr lang="en-US"/>
           </a:p>
@@ -673,7 +678,7 @@
           <a:p>
             <a:fld id="{8AB05285-0B91-4384-B165-2D0E05AA8C57}" type="datetimeFigureOut">
               <a:rPr lang="en-US" smtClean="0"/>
-              <a:t>5/16/2023</a:t>
+              <a:t>5/24/2023</a:t>
             </a:fld>
             <a:endParaRPr lang="en-US"/>
           </a:p>
@@ -871,7 +876,7 @@
           <a:p>
             <a:fld id="{8AB05285-0B91-4384-B165-2D0E05AA8C57}" type="datetimeFigureOut">
               <a:rPr lang="en-US" smtClean="0"/>
-              <a:t>5/16/2023</a:t>
+              <a:t>5/24/2023</a:t>
             </a:fld>
             <a:endParaRPr lang="en-US"/>
           </a:p>
@@ -1146,7 +1151,7 @@
           <a:p>
             <a:fld id="{8AB05285-0B91-4384-B165-2D0E05AA8C57}" type="datetimeFigureOut">
               <a:rPr lang="en-US" smtClean="0"/>
-              <a:t>5/16/2023</a:t>
+              <a:t>5/24/2023</a:t>
             </a:fld>
             <a:endParaRPr lang="en-US"/>
           </a:p>
@@ -1411,7 +1416,7 @@
           <a:p>
             <a:fld id="{8AB05285-0B91-4384-B165-2D0E05AA8C57}" type="datetimeFigureOut">
               <a:rPr lang="en-US" smtClean="0"/>
-              <a:t>5/16/2023</a:t>
+              <a:t>5/24/2023</a:t>
             </a:fld>
             <a:endParaRPr lang="en-US"/>
           </a:p>
@@ -1823,7 +1828,7 @@
           <a:p>
             <a:fld id="{8AB05285-0B91-4384-B165-2D0E05AA8C57}" type="datetimeFigureOut">
               <a:rPr lang="en-US" smtClean="0"/>
-              <a:t>5/16/2023</a:t>
+              <a:t>5/24/2023</a:t>
             </a:fld>
             <a:endParaRPr lang="en-US"/>
           </a:p>
@@ -1964,7 +1969,7 @@
           <a:p>
             <a:fld id="{8AB05285-0B91-4384-B165-2D0E05AA8C57}" type="datetimeFigureOut">
               <a:rPr lang="en-US" smtClean="0"/>
-              <a:t>5/16/2023</a:t>
+              <a:t>5/24/2023</a:t>
             </a:fld>
             <a:endParaRPr lang="en-US"/>
           </a:p>
@@ -2077,7 +2082,7 @@
           <a:p>
             <a:fld id="{8AB05285-0B91-4384-B165-2D0E05AA8C57}" type="datetimeFigureOut">
               <a:rPr lang="en-US" smtClean="0"/>
-              <a:t>5/16/2023</a:t>
+              <a:t>5/24/2023</a:t>
             </a:fld>
             <a:endParaRPr lang="en-US"/>
           </a:p>
@@ -2388,7 +2393,7 @@
           <a:p>
             <a:fld id="{8AB05285-0B91-4384-B165-2D0E05AA8C57}" type="datetimeFigureOut">
               <a:rPr lang="en-US" smtClean="0"/>
-              <a:t>5/16/2023</a:t>
+              <a:t>5/24/2023</a:t>
             </a:fld>
             <a:endParaRPr lang="en-US"/>
           </a:p>
@@ -2676,7 +2681,7 @@
           <a:p>
             <a:fld id="{8AB05285-0B91-4384-B165-2D0E05AA8C57}" type="datetimeFigureOut">
               <a:rPr lang="en-US" smtClean="0"/>
-              <a:t>5/16/2023</a:t>
+              <a:t>5/24/2023</a:t>
             </a:fld>
             <a:endParaRPr lang="en-US"/>
           </a:p>
@@ -2917,7 +2922,7 @@
           <a:p>
             <a:fld id="{8AB05285-0B91-4384-B165-2D0E05AA8C57}" type="datetimeFigureOut">
               <a:rPr lang="en-US" smtClean="0"/>
-              <a:t>5/16/2023</a:t>
+              <a:t>5/24/2023</a:t>
             </a:fld>
             <a:endParaRPr lang="en-US"/>
           </a:p>
@@ -7232,7 +7237,7 @@
               <a:rPr lang="en-US" sz="2000" dirty="0">
                 <a:latin typeface="+mj-lt"/>
               </a:rPr>
-              <a:t>MvcSimple Authorization</a:t>
+              <a:t>Simple Authorization</a:t>
             </a:r>
             <a:br>
               <a:rPr lang="en-US" sz="2000" dirty="0">
@@ -15820,7 +15825,7 @@
               <a:rPr lang="en-US" sz="2000" dirty="0">
                 <a:latin typeface="+mj-lt"/>
               </a:rPr>
-              <a:t>MvcSimple Authorization</a:t>
+              <a:t>Simple Authorization</a:t>
             </a:r>
             <a:br>
               <a:rPr lang="en-US" sz="2000" dirty="0">
@@ -16197,6 +16202,25 @@
 </file>
 
 <file path=customXml/item1.xml><?xml version="1.0" encoding="utf-8"?>
+<p:properties xmlns:p="http://schemas.microsoft.com/office/2006/metadata/properties" xmlns:xsi="http://www.w3.org/2001/XMLSchema-instance" xmlns:pc="http://schemas.microsoft.com/office/infopath/2007/PartnerControls">
+  <documentManagement>
+    <_ip_UnifiedCompliancePolicyUIAction xmlns="http://schemas.microsoft.com/sharepoint/v3" xsi:nil="true"/>
+    <_activity xmlns="bca6f5a9-4c80-4921-b158-9582d1f27099" xsi:nil="true"/>
+    <_ip_UnifiedCompliancePolicyProperties xmlns="http://schemas.microsoft.com/sharepoint/v3" xsi:nil="true"/>
+  </documentManagement>
+</p:properties>
+</file>
+
+<file path=customXml/item2.xml><?xml version="1.0" encoding="utf-8"?>
+<?mso-contentType ?>
+<FormTemplates xmlns="http://schemas.microsoft.com/sharepoint/v3/contenttype/forms">
+  <Display>DocumentLibraryForm</Display>
+  <Edit>DocumentLibraryForm</Edit>
+  <New>DocumentLibraryForm</New>
+</FormTemplates>
+</file>
+
+<file path=customXml/item3.xml><?xml version="1.0" encoding="utf-8"?>
 <ct:contentTypeSchema xmlns:ct="http://schemas.microsoft.com/office/2006/metadata/contentType" xmlns:ma="http://schemas.microsoft.com/office/2006/metadata/properties/metaAttributes" ct:_="" ma:_="" ma:contentTypeName="Document" ma:contentTypeID="0x01010047E889AABEA68245AE76A2D63AFCE091" ma:contentTypeVersion="15" ma:contentTypeDescription="Create a new document." ma:contentTypeScope="" ma:versionID="2df8dc01c5770599378050f8f2dbaf81">
   <xsd:schema xmlns:xsd="http://www.w3.org/2001/XMLSchema" xmlns:xs="http://www.w3.org/2001/XMLSchema" xmlns:p="http://schemas.microsoft.com/office/2006/metadata/properties" xmlns:ns1="http://schemas.microsoft.com/sharepoint/v3" xmlns:ns3="92a34e10-59d3-493d-8f45-2573b0550067" xmlns:ns4="bca6f5a9-4c80-4921-b158-9582d1f27099" targetNamespace="http://schemas.microsoft.com/office/2006/metadata/properties" ma:root="true" ma:fieldsID="e310ddbee985d03b21c2029ea268d049" ns1:_="" ns3:_="" ns4:_="">
     <xsd:import namespace="http://schemas.microsoft.com/sharepoint/v3"/>
@@ -16434,26 +16458,33 @@
 </ct:contentTypeSchema>
 </file>
 
-<file path=customXml/item2.xml><?xml version="1.0" encoding="utf-8"?>
-<?mso-contentType ?>
-<FormTemplates xmlns="http://schemas.microsoft.com/sharepoint/v3/contenttype/forms">
-  <Display>DocumentLibraryForm</Display>
-  <Edit>DocumentLibraryForm</Edit>
-  <New>DocumentLibraryForm</New>
-</FormTemplates>
+<file path=customXml/itemProps1.xml><?xml version="1.0" encoding="utf-8"?>
+<ds:datastoreItem xmlns:ds="http://schemas.openxmlformats.org/officeDocument/2006/customXml" ds:itemID="{CA8197C6-825C-49A4-A5B0-24EBEE10CF7C}">
+  <ds:schemaRefs>
+    <ds:schemaRef ds:uri="http://schemas.microsoft.com/office/2006/metadata/properties"/>
+    <ds:schemaRef ds:uri="http://www.w3.org/XML/1998/namespace"/>
+    <ds:schemaRef ds:uri="http://purl.org/dc/terms/"/>
+    <ds:schemaRef ds:uri="http://schemas.openxmlformats.org/package/2006/metadata/core-properties"/>
+    <ds:schemaRef ds:uri="http://schemas.microsoft.com/office/2006/documentManagement/types"/>
+    <ds:schemaRef ds:uri="http://schemas.microsoft.com/office/infopath/2007/PartnerControls"/>
+    <ds:schemaRef ds:uri="http://purl.org/dc/elements/1.1/"/>
+    <ds:schemaRef ds:uri="http://schemas.microsoft.com/sharepoint/v3"/>
+    <ds:schemaRef ds:uri="bca6f5a9-4c80-4921-b158-9582d1f27099"/>
+    <ds:schemaRef ds:uri="92a34e10-59d3-493d-8f45-2573b0550067"/>
+    <ds:schemaRef ds:uri="http://purl.org/dc/dcmitype/"/>
+  </ds:schemaRefs>
+</ds:datastoreItem>
 </file>
 
-<file path=customXml/item3.xml><?xml version="1.0" encoding="utf-8"?>
-<p:properties xmlns:p="http://schemas.microsoft.com/office/2006/metadata/properties" xmlns:xsi="http://www.w3.org/2001/XMLSchema-instance" xmlns:pc="http://schemas.microsoft.com/office/infopath/2007/PartnerControls">
-  <documentManagement>
-    <_ip_UnifiedCompliancePolicyUIAction xmlns="http://schemas.microsoft.com/sharepoint/v3" xsi:nil="true"/>
-    <_activity xmlns="bca6f5a9-4c80-4921-b158-9582d1f27099" xsi:nil="true"/>
-    <_ip_UnifiedCompliancePolicyProperties xmlns="http://schemas.microsoft.com/sharepoint/v3" xsi:nil="true"/>
-  </documentManagement>
-</p:properties>
+<file path=customXml/itemProps2.xml><?xml version="1.0" encoding="utf-8"?>
+<ds:datastoreItem xmlns:ds="http://schemas.openxmlformats.org/officeDocument/2006/customXml" ds:itemID="{09DA3E7A-8DAA-4D9A-8D50-099620A1856E}">
+  <ds:schemaRefs>
+    <ds:schemaRef ds:uri="http://schemas.microsoft.com/sharepoint/v3/contenttype/forms"/>
+  </ds:schemaRefs>
+</ds:datastoreItem>
 </file>
 
-<file path=customXml/itemProps1.xml><?xml version="1.0" encoding="utf-8"?>
+<file path=customXml/itemProps3.xml><?xml version="1.0" encoding="utf-8"?>
 <ds:datastoreItem xmlns:ds="http://schemas.openxmlformats.org/officeDocument/2006/customXml" ds:itemID="{1C367D11-4C95-43AA-BBC1-F8FABE8C0D47}">
   <ds:schemaRefs>
     <ds:schemaRef ds:uri="http://schemas.microsoft.com/office/2006/metadata/contentType"/>
@@ -16471,30 +16502,4 @@
     <ds:schemaRef ds:uri="http://schemas.microsoft.com/internal/obd"/>
   </ds:schemaRefs>
 </ds:datastoreItem>
-</file>
-
-<file path=customXml/itemProps2.xml><?xml version="1.0" encoding="utf-8"?>
-<ds:datastoreItem xmlns:ds="http://schemas.openxmlformats.org/officeDocument/2006/customXml" ds:itemID="{09DA3E7A-8DAA-4D9A-8D50-099620A1856E}">
-  <ds:schemaRefs>
-    <ds:schemaRef ds:uri="http://schemas.microsoft.com/sharepoint/v3/contenttype/forms"/>
-  </ds:schemaRefs>
-</ds:datastoreItem>
-</file>
-
-<file path=customXml/itemProps3.xml><?xml version="1.0" encoding="utf-8"?>
-<ds:datastoreItem xmlns:ds="http://schemas.openxmlformats.org/officeDocument/2006/customXml" ds:itemID="{CA8197C6-825C-49A4-A5B0-24EBEE10CF7C}">
-  <ds:schemaRefs>
-    <ds:schemaRef ds:uri="92a34e10-59d3-493d-8f45-2573b0550067"/>
-    <ds:schemaRef ds:uri="http://purl.org/dc/terms/"/>
-    <ds:schemaRef ds:uri="http://schemas.microsoft.com/office/2006/metadata/properties"/>
-    <ds:schemaRef ds:uri="http://schemas.microsoft.com/office/infopath/2007/PartnerControls"/>
-    <ds:schemaRef ds:uri="http://schemas.microsoft.com/office/2006/documentManagement/types"/>
-    <ds:schemaRef ds:uri="http://www.w3.org/XML/1998/namespace"/>
-    <ds:schemaRef ds:uri="http://schemas.openxmlformats.org/package/2006/metadata/core-properties"/>
-    <ds:schemaRef ds:uri="bca6f5a9-4c80-4921-b158-9582d1f27099"/>
-    <ds:schemaRef ds:uri="http://schemas.microsoft.com/sharepoint/v3"/>
-    <ds:schemaRef ds:uri="http://purl.org/dc/dcmitype/"/>
-    <ds:schemaRef ds:uri="http://purl.org/dc/elements/1.1/"/>
-  </ds:schemaRefs>
-</ds:datastoreItem>
 </file>
</xml_diff>